<commit_message>
Added the title and table of contents.
</commit_message>
<xml_diff>
--- a/others/LLM_On_CyberSecurityQuestions/img/designDoc.pptx
+++ b/others/LLM_On_CyberSecurityQuestions/img/designDoc.pptx
@@ -5,7 +5,8 @@
     <p:sldMasterId id="2147483648" r:id="rId1"/>
   </p:sldMasterIdLst>
   <p:sldIdLst>
-    <p:sldId id="256" r:id="rId2"/>
+    <p:sldId id="257" r:id="rId2"/>
+    <p:sldId id="256" r:id="rId3"/>
   </p:sldIdLst>
   <p:sldSz cx="12192000" cy="6858000"/>
   <p:notesSz cx="6858000" cy="9144000"/>
@@ -104,6 +105,11 @@
       </a:defRPr>
     </a:lvl9pPr>
   </p:defaultTextStyle>
+  <p:extLst>
+    <p:ext uri="{EFAFB233-063F-42B5-8137-9DF3F51BA10A}">
+      <p15:sldGuideLst xmlns:p15="http://schemas.microsoft.com/office/powerpoint/2012/main"/>
+    </p:ext>
+  </p:extLst>
 </p:presentation>
 </file>
 
@@ -256,7 +262,7 @@
           <a:p>
             <a:fld id="{A0216C5E-3C43-42C0-A23A-D3C8505979B7}" type="datetimeFigureOut">
               <a:rPr lang="en-SG" smtClean="0"/>
-              <a:t>3/9/2024</a:t>
+              <a:t>8/9/2024</a:t>
             </a:fld>
             <a:endParaRPr lang="en-SG"/>
           </a:p>
@@ -456,7 +462,7 @@
           <a:p>
             <a:fld id="{A0216C5E-3C43-42C0-A23A-D3C8505979B7}" type="datetimeFigureOut">
               <a:rPr lang="en-SG" smtClean="0"/>
-              <a:t>3/9/2024</a:t>
+              <a:t>8/9/2024</a:t>
             </a:fld>
             <a:endParaRPr lang="en-SG"/>
           </a:p>
@@ -666,7 +672,7 @@
           <a:p>
             <a:fld id="{A0216C5E-3C43-42C0-A23A-D3C8505979B7}" type="datetimeFigureOut">
               <a:rPr lang="en-SG" smtClean="0"/>
-              <a:t>3/9/2024</a:t>
+              <a:t>8/9/2024</a:t>
             </a:fld>
             <a:endParaRPr lang="en-SG"/>
           </a:p>
@@ -866,7 +872,7 @@
           <a:p>
             <a:fld id="{A0216C5E-3C43-42C0-A23A-D3C8505979B7}" type="datetimeFigureOut">
               <a:rPr lang="en-SG" smtClean="0"/>
-              <a:t>3/9/2024</a:t>
+              <a:t>8/9/2024</a:t>
             </a:fld>
             <a:endParaRPr lang="en-SG"/>
           </a:p>
@@ -1142,7 +1148,7 @@
           <a:p>
             <a:fld id="{A0216C5E-3C43-42C0-A23A-D3C8505979B7}" type="datetimeFigureOut">
               <a:rPr lang="en-SG" smtClean="0"/>
-              <a:t>3/9/2024</a:t>
+              <a:t>8/9/2024</a:t>
             </a:fld>
             <a:endParaRPr lang="en-SG"/>
           </a:p>
@@ -1410,7 +1416,7 @@
           <a:p>
             <a:fld id="{A0216C5E-3C43-42C0-A23A-D3C8505979B7}" type="datetimeFigureOut">
               <a:rPr lang="en-SG" smtClean="0"/>
-              <a:t>3/9/2024</a:t>
+              <a:t>8/9/2024</a:t>
             </a:fld>
             <a:endParaRPr lang="en-SG"/>
           </a:p>
@@ -1825,7 +1831,7 @@
           <a:p>
             <a:fld id="{A0216C5E-3C43-42C0-A23A-D3C8505979B7}" type="datetimeFigureOut">
               <a:rPr lang="en-SG" smtClean="0"/>
-              <a:t>3/9/2024</a:t>
+              <a:t>8/9/2024</a:t>
             </a:fld>
             <a:endParaRPr lang="en-SG"/>
           </a:p>
@@ -1967,7 +1973,7 @@
           <a:p>
             <a:fld id="{A0216C5E-3C43-42C0-A23A-D3C8505979B7}" type="datetimeFigureOut">
               <a:rPr lang="en-SG" smtClean="0"/>
-              <a:t>3/9/2024</a:t>
+              <a:t>8/9/2024</a:t>
             </a:fld>
             <a:endParaRPr lang="en-SG"/>
           </a:p>
@@ -2080,7 +2086,7 @@
           <a:p>
             <a:fld id="{A0216C5E-3C43-42C0-A23A-D3C8505979B7}" type="datetimeFigureOut">
               <a:rPr lang="en-SG" smtClean="0"/>
-              <a:t>3/9/2024</a:t>
+              <a:t>8/9/2024</a:t>
             </a:fld>
             <a:endParaRPr lang="en-SG"/>
           </a:p>
@@ -2393,7 +2399,7 @@
           <a:p>
             <a:fld id="{A0216C5E-3C43-42C0-A23A-D3C8505979B7}" type="datetimeFigureOut">
               <a:rPr lang="en-SG" smtClean="0"/>
-              <a:t>3/9/2024</a:t>
+              <a:t>8/9/2024</a:t>
             </a:fld>
             <a:endParaRPr lang="en-SG"/>
           </a:p>
@@ -2682,7 +2688,7 @@
           <a:p>
             <a:fld id="{A0216C5E-3C43-42C0-A23A-D3C8505979B7}" type="datetimeFigureOut">
               <a:rPr lang="en-SG" smtClean="0"/>
-              <a:t>3/9/2024</a:t>
+              <a:t>8/9/2024</a:t>
             </a:fld>
             <a:endParaRPr lang="en-SG"/>
           </a:p>
@@ -2925,7 +2931,7 @@
           <a:p>
             <a:fld id="{A0216C5E-3C43-42C0-A23A-D3C8505979B7}" type="datetimeFigureOut">
               <a:rPr lang="en-SG" smtClean="0"/>
-              <a:t>3/9/2024</a:t>
+              <a:t>8/9/2024</a:t>
             </a:fld>
             <a:endParaRPr lang="en-SG"/>
           </a:p>
@@ -3342,6 +3348,1112 @@
           <a:chExt cx="0" cy="0"/>
         </a:xfrm>
       </p:grpSpPr>
+      <p:pic>
+        <p:nvPicPr>
+          <p:cNvPr id="1028" name="Picture 4" descr="Cyber security. Information protect and or safe concept. Abstract 3D sphere or globe with surface of hexagons with Lock icon in wireframe hand. Cyber security or network security. Vector illustration. 29693723 Vector Art at Vecteezy">
+            <a:extLst>
+              <a:ext uri="{FF2B5EF4-FFF2-40B4-BE49-F238E27FC236}">
+                <a16:creationId xmlns:a16="http://schemas.microsoft.com/office/drawing/2014/main" id="{ACB460EF-4255-BFCE-AC2A-F7820A8BC694}"/>
+              </a:ext>
+            </a:extLst>
+          </p:cNvPr>
+          <p:cNvPicPr>
+            <a:picLocks noChangeAspect="1" noChangeArrowheads="1"/>
+          </p:cNvPicPr>
+          <p:nvPr/>
+        </p:nvPicPr>
+        <p:blipFill>
+          <a:blip r:embed="rId2">
+            <a:extLst>
+              <a:ext uri="{28A0092B-C50C-407E-A947-70E740481C1C}">
+                <a14:useLocalDpi xmlns:a14="http://schemas.microsoft.com/office/drawing/2010/main" val="0"/>
+              </a:ext>
+            </a:extLst>
+          </a:blip>
+          <a:srcRect/>
+          <a:stretch>
+            <a:fillRect/>
+          </a:stretch>
+        </p:blipFill>
+        <p:spPr bwMode="auto">
+          <a:xfrm>
+            <a:off x="1245837" y="642772"/>
+            <a:ext cx="6968907" cy="3920520"/>
+          </a:xfrm>
+          <a:prstGeom prst="rect">
+            <a:avLst/>
+          </a:prstGeom>
+          <a:noFill/>
+          <a:extLst>
+            <a:ext uri="{909E8E84-426E-40DD-AFC4-6F175D3DCCD1}">
+              <a14:hiddenFill xmlns:a14="http://schemas.microsoft.com/office/drawing/2010/main">
+                <a:solidFill>
+                  <a:srgbClr val="FFFFFF"/>
+                </a:solidFill>
+              </a14:hiddenFill>
+            </a:ext>
+          </a:extLst>
+        </p:spPr>
+      </p:pic>
+      <p:pic>
+        <p:nvPicPr>
+          <p:cNvPr id="11" name="Picture 10">
+            <a:extLst>
+              <a:ext uri="{FF2B5EF4-FFF2-40B4-BE49-F238E27FC236}">
+                <a16:creationId xmlns:a16="http://schemas.microsoft.com/office/drawing/2014/main" id="{E6903C0B-9CC6-B072-07EE-162DC05EA2AE}"/>
+              </a:ext>
+            </a:extLst>
+          </p:cNvPr>
+          <p:cNvPicPr>
+            <a:picLocks noChangeAspect="1"/>
+          </p:cNvPicPr>
+          <p:nvPr/>
+        </p:nvPicPr>
+        <p:blipFill>
+          <a:blip r:embed="rId3"/>
+          <a:stretch>
+            <a:fillRect/>
+          </a:stretch>
+        </p:blipFill>
+        <p:spPr>
+          <a:xfrm>
+            <a:off x="3689930" y="1269192"/>
+            <a:ext cx="699190" cy="724770"/>
+          </a:xfrm>
+          <a:prstGeom prst="rect">
+            <a:avLst/>
+          </a:prstGeom>
+          <a:ln w="19050" cap="sq">
+            <a:solidFill>
+              <a:srgbClr val="000000"/>
+            </a:solidFill>
+            <a:prstDash val="solid"/>
+            <a:miter lim="800000"/>
+          </a:ln>
+          <a:effectLst>
+            <a:outerShdw blurRad="50800" dist="38100" dir="2700000" algn="tl" rotWithShape="0">
+              <a:srgbClr val="000000">
+                <a:alpha val="43000"/>
+              </a:srgbClr>
+            </a:outerShdw>
+          </a:effectLst>
+        </p:spPr>
+      </p:pic>
+      <p:cxnSp>
+        <p:nvCxnSpPr>
+          <p:cNvPr id="13" name="Straight Connector 12">
+            <a:extLst>
+              <a:ext uri="{FF2B5EF4-FFF2-40B4-BE49-F238E27FC236}">
+                <a16:creationId xmlns:a16="http://schemas.microsoft.com/office/drawing/2014/main" id="{B00DB382-1423-12B9-7FFB-B8A4870D79C9}"/>
+              </a:ext>
+            </a:extLst>
+          </p:cNvPr>
+          <p:cNvCxnSpPr/>
+          <p:nvPr/>
+        </p:nvCxnSpPr>
+        <p:spPr>
+          <a:xfrm>
+            <a:off x="4389120" y="1818762"/>
+            <a:ext cx="435429" cy="0"/>
+          </a:xfrm>
+          <a:prstGeom prst="line">
+            <a:avLst/>
+          </a:prstGeom>
+          <a:ln w="28575">
+            <a:solidFill>
+              <a:schemeClr val="bg1"/>
+            </a:solidFill>
+            <a:prstDash val="solid"/>
+          </a:ln>
+        </p:spPr>
+        <p:style>
+          <a:lnRef idx="2">
+            <a:schemeClr val="accent1"/>
+          </a:lnRef>
+          <a:fillRef idx="0">
+            <a:schemeClr val="accent1"/>
+          </a:fillRef>
+          <a:effectRef idx="1">
+            <a:schemeClr val="accent1"/>
+          </a:effectRef>
+          <a:fontRef idx="minor">
+            <a:schemeClr val="tx1"/>
+          </a:fontRef>
+        </p:style>
+      </p:cxnSp>
+      <p:cxnSp>
+        <p:nvCxnSpPr>
+          <p:cNvPr id="14" name="Straight Connector 13">
+            <a:extLst>
+              <a:ext uri="{FF2B5EF4-FFF2-40B4-BE49-F238E27FC236}">
+                <a16:creationId xmlns:a16="http://schemas.microsoft.com/office/drawing/2014/main" id="{2733967A-C97E-6853-F4C0-3E3C90CDF84E}"/>
+              </a:ext>
+            </a:extLst>
+          </p:cNvPr>
+          <p:cNvCxnSpPr>
+            <a:cxnSpLocks/>
+          </p:cNvCxnSpPr>
+          <p:nvPr/>
+        </p:nvCxnSpPr>
+        <p:spPr>
+          <a:xfrm>
+            <a:off x="4824549" y="1818762"/>
+            <a:ext cx="252548" cy="175200"/>
+          </a:xfrm>
+          <a:prstGeom prst="line">
+            <a:avLst/>
+          </a:prstGeom>
+          <a:ln w="28575">
+            <a:solidFill>
+              <a:schemeClr val="bg1"/>
+            </a:solidFill>
+            <a:prstDash val="sysDot"/>
+          </a:ln>
+        </p:spPr>
+        <p:style>
+          <a:lnRef idx="2">
+            <a:schemeClr val="accent1"/>
+          </a:lnRef>
+          <a:fillRef idx="0">
+            <a:schemeClr val="accent1"/>
+          </a:fillRef>
+          <a:effectRef idx="1">
+            <a:schemeClr val="accent1"/>
+          </a:effectRef>
+          <a:fontRef idx="minor">
+            <a:schemeClr val="tx1"/>
+          </a:fontRef>
+        </p:style>
+      </p:cxnSp>
+      <p:pic>
+        <p:nvPicPr>
+          <p:cNvPr id="18" name="Picture 17">
+            <a:extLst>
+              <a:ext uri="{FF2B5EF4-FFF2-40B4-BE49-F238E27FC236}">
+                <a16:creationId xmlns:a16="http://schemas.microsoft.com/office/drawing/2014/main" id="{B7837C23-285B-34DF-EEAD-720730B5F8C2}"/>
+              </a:ext>
+            </a:extLst>
+          </p:cNvPr>
+          <p:cNvPicPr>
+            <a:picLocks noChangeAspect="1"/>
+          </p:cNvPicPr>
+          <p:nvPr/>
+        </p:nvPicPr>
+        <p:blipFill>
+          <a:blip r:embed="rId4"/>
+          <a:stretch>
+            <a:fillRect/>
+          </a:stretch>
+        </p:blipFill>
+        <p:spPr>
+          <a:xfrm>
+            <a:off x="3612541" y="2132473"/>
+            <a:ext cx="699190" cy="651245"/>
+          </a:xfrm>
+          <a:prstGeom prst="rect">
+            <a:avLst/>
+          </a:prstGeom>
+          <a:ln w="19050" cap="sq">
+            <a:solidFill>
+              <a:srgbClr val="000000"/>
+            </a:solidFill>
+            <a:prstDash val="solid"/>
+            <a:miter lim="800000"/>
+          </a:ln>
+          <a:effectLst>
+            <a:outerShdw blurRad="50800" dist="38100" dir="2700000" algn="tl" rotWithShape="0">
+              <a:srgbClr val="000000">
+                <a:alpha val="43000"/>
+              </a:srgbClr>
+            </a:outerShdw>
+          </a:effectLst>
+        </p:spPr>
+      </p:pic>
+      <p:cxnSp>
+        <p:nvCxnSpPr>
+          <p:cNvPr id="19" name="Straight Connector 18">
+            <a:extLst>
+              <a:ext uri="{FF2B5EF4-FFF2-40B4-BE49-F238E27FC236}">
+                <a16:creationId xmlns:a16="http://schemas.microsoft.com/office/drawing/2014/main" id="{24057507-64D9-BE24-E273-B9A44B3B42E9}"/>
+              </a:ext>
+            </a:extLst>
+          </p:cNvPr>
+          <p:cNvCxnSpPr>
+            <a:cxnSpLocks/>
+          </p:cNvCxnSpPr>
+          <p:nvPr/>
+        </p:nvCxnSpPr>
+        <p:spPr>
+          <a:xfrm>
+            <a:off x="4311731" y="2519802"/>
+            <a:ext cx="582486" cy="0"/>
+          </a:xfrm>
+          <a:prstGeom prst="line">
+            <a:avLst/>
+          </a:prstGeom>
+          <a:ln w="28575">
+            <a:solidFill>
+              <a:schemeClr val="bg1"/>
+            </a:solidFill>
+            <a:prstDash val="solid"/>
+          </a:ln>
+        </p:spPr>
+        <p:style>
+          <a:lnRef idx="2">
+            <a:schemeClr val="accent1"/>
+          </a:lnRef>
+          <a:fillRef idx="0">
+            <a:schemeClr val="accent1"/>
+          </a:fillRef>
+          <a:effectRef idx="1">
+            <a:schemeClr val="accent1"/>
+          </a:effectRef>
+          <a:fontRef idx="minor">
+            <a:schemeClr val="tx1"/>
+          </a:fontRef>
+        </p:style>
+      </p:cxnSp>
+      <p:pic>
+        <p:nvPicPr>
+          <p:cNvPr id="23" name="Picture 22">
+            <a:extLst>
+              <a:ext uri="{FF2B5EF4-FFF2-40B4-BE49-F238E27FC236}">
+                <a16:creationId xmlns:a16="http://schemas.microsoft.com/office/drawing/2014/main" id="{986013A0-1E9E-1A37-5E46-7D7EBAE0B6B9}"/>
+              </a:ext>
+            </a:extLst>
+          </p:cNvPr>
+          <p:cNvPicPr>
+            <a:picLocks noChangeAspect="1"/>
+          </p:cNvPicPr>
+          <p:nvPr/>
+        </p:nvPicPr>
+        <p:blipFill>
+          <a:blip r:embed="rId5"/>
+          <a:stretch>
+            <a:fillRect/>
+          </a:stretch>
+        </p:blipFill>
+        <p:spPr>
+          <a:xfrm>
+            <a:off x="3689930" y="2994753"/>
+            <a:ext cx="737485" cy="708564"/>
+          </a:xfrm>
+          <a:prstGeom prst="rect">
+            <a:avLst/>
+          </a:prstGeom>
+          <a:ln w="19050" cap="sq">
+            <a:solidFill>
+              <a:srgbClr val="000000"/>
+            </a:solidFill>
+            <a:prstDash val="solid"/>
+            <a:miter lim="800000"/>
+          </a:ln>
+          <a:effectLst>
+            <a:outerShdw blurRad="50800" dist="38100" dir="2700000" algn="tl" rotWithShape="0">
+              <a:srgbClr val="000000">
+                <a:alpha val="43000"/>
+              </a:srgbClr>
+            </a:outerShdw>
+          </a:effectLst>
+        </p:spPr>
+      </p:pic>
+      <p:cxnSp>
+        <p:nvCxnSpPr>
+          <p:cNvPr id="24" name="Straight Connector 23">
+            <a:extLst>
+              <a:ext uri="{FF2B5EF4-FFF2-40B4-BE49-F238E27FC236}">
+                <a16:creationId xmlns:a16="http://schemas.microsoft.com/office/drawing/2014/main" id="{0DD0F8AF-6D0C-88DE-97B1-A29F0099B58D}"/>
+              </a:ext>
+            </a:extLst>
+          </p:cNvPr>
+          <p:cNvCxnSpPr/>
+          <p:nvPr/>
+        </p:nvCxnSpPr>
+        <p:spPr>
+          <a:xfrm>
+            <a:off x="4389614" y="3207779"/>
+            <a:ext cx="435429" cy="0"/>
+          </a:xfrm>
+          <a:prstGeom prst="line">
+            <a:avLst/>
+          </a:prstGeom>
+          <a:ln w="28575">
+            <a:solidFill>
+              <a:schemeClr val="bg1"/>
+            </a:solidFill>
+            <a:prstDash val="solid"/>
+          </a:ln>
+        </p:spPr>
+        <p:style>
+          <a:lnRef idx="2">
+            <a:schemeClr val="accent1"/>
+          </a:lnRef>
+          <a:fillRef idx="0">
+            <a:schemeClr val="accent1"/>
+          </a:fillRef>
+          <a:effectRef idx="1">
+            <a:schemeClr val="accent1"/>
+          </a:effectRef>
+          <a:fontRef idx="minor">
+            <a:schemeClr val="tx1"/>
+          </a:fontRef>
+        </p:style>
+      </p:cxnSp>
+      <p:pic>
+        <p:nvPicPr>
+          <p:cNvPr id="26" name="Picture 25">
+            <a:extLst>
+              <a:ext uri="{FF2B5EF4-FFF2-40B4-BE49-F238E27FC236}">
+                <a16:creationId xmlns:a16="http://schemas.microsoft.com/office/drawing/2014/main" id="{00D66897-F89C-BE12-8EB2-75AADF37DC0A}"/>
+              </a:ext>
+            </a:extLst>
+          </p:cNvPr>
+          <p:cNvPicPr>
+            <a:picLocks noChangeAspect="1"/>
+          </p:cNvPicPr>
+          <p:nvPr/>
+        </p:nvPicPr>
+        <p:blipFill>
+          <a:blip r:embed="rId6"/>
+          <a:stretch>
+            <a:fillRect/>
+          </a:stretch>
+        </p:blipFill>
+        <p:spPr>
+          <a:xfrm>
+            <a:off x="6902329" y="1184435"/>
+            <a:ext cx="771971" cy="809527"/>
+          </a:xfrm>
+          <a:prstGeom prst="rect">
+            <a:avLst/>
+          </a:prstGeom>
+          <a:ln w="19050" cap="sq">
+            <a:solidFill>
+              <a:srgbClr val="000000"/>
+            </a:solidFill>
+            <a:prstDash val="solid"/>
+            <a:miter lim="800000"/>
+          </a:ln>
+          <a:effectLst>
+            <a:outerShdw blurRad="50800" dist="38100" dir="2700000" algn="tl" rotWithShape="0">
+              <a:srgbClr val="000000">
+                <a:alpha val="43000"/>
+              </a:srgbClr>
+            </a:outerShdw>
+          </a:effectLst>
+        </p:spPr>
+      </p:pic>
+      <p:cxnSp>
+        <p:nvCxnSpPr>
+          <p:cNvPr id="29" name="Straight Connector 28">
+            <a:extLst>
+              <a:ext uri="{FF2B5EF4-FFF2-40B4-BE49-F238E27FC236}">
+                <a16:creationId xmlns:a16="http://schemas.microsoft.com/office/drawing/2014/main" id="{15CE64ED-C722-1B1A-4EC1-5280AB8FA33B}"/>
+              </a:ext>
+            </a:extLst>
+          </p:cNvPr>
+          <p:cNvCxnSpPr>
+            <a:cxnSpLocks/>
+          </p:cNvCxnSpPr>
+          <p:nvPr/>
+        </p:nvCxnSpPr>
+        <p:spPr>
+          <a:xfrm flipV="1">
+            <a:off x="4824549" y="2964905"/>
+            <a:ext cx="252548" cy="232653"/>
+          </a:xfrm>
+          <a:prstGeom prst="line">
+            <a:avLst/>
+          </a:prstGeom>
+          <a:ln w="28575">
+            <a:solidFill>
+              <a:schemeClr val="bg1"/>
+            </a:solidFill>
+            <a:prstDash val="sysDot"/>
+          </a:ln>
+        </p:spPr>
+        <p:style>
+          <a:lnRef idx="2">
+            <a:schemeClr val="accent1"/>
+          </a:lnRef>
+          <a:fillRef idx="0">
+            <a:schemeClr val="accent1"/>
+          </a:fillRef>
+          <a:effectRef idx="1">
+            <a:schemeClr val="accent1"/>
+          </a:effectRef>
+          <a:fontRef idx="minor">
+            <a:schemeClr val="tx1"/>
+          </a:fontRef>
+        </p:style>
+      </p:cxnSp>
+      <p:cxnSp>
+        <p:nvCxnSpPr>
+          <p:cNvPr id="31" name="Straight Connector 30">
+            <a:extLst>
+              <a:ext uri="{FF2B5EF4-FFF2-40B4-BE49-F238E27FC236}">
+                <a16:creationId xmlns:a16="http://schemas.microsoft.com/office/drawing/2014/main" id="{9D528B58-EAB2-5F14-B913-31E56E81B0A0}"/>
+              </a:ext>
+            </a:extLst>
+          </p:cNvPr>
+          <p:cNvCxnSpPr/>
+          <p:nvPr/>
+        </p:nvCxnSpPr>
+        <p:spPr>
+          <a:xfrm>
+            <a:off x="6450037" y="1818762"/>
+            <a:ext cx="435429" cy="0"/>
+          </a:xfrm>
+          <a:prstGeom prst="line">
+            <a:avLst/>
+          </a:prstGeom>
+          <a:ln w="28575">
+            <a:solidFill>
+              <a:schemeClr val="bg1"/>
+            </a:solidFill>
+            <a:prstDash val="solid"/>
+          </a:ln>
+        </p:spPr>
+        <p:style>
+          <a:lnRef idx="2">
+            <a:schemeClr val="accent1"/>
+          </a:lnRef>
+          <a:fillRef idx="0">
+            <a:schemeClr val="accent1"/>
+          </a:fillRef>
+          <a:effectRef idx="1">
+            <a:schemeClr val="accent1"/>
+          </a:effectRef>
+          <a:fontRef idx="minor">
+            <a:schemeClr val="tx1"/>
+          </a:fontRef>
+        </p:style>
+      </p:cxnSp>
+      <p:cxnSp>
+        <p:nvCxnSpPr>
+          <p:cNvPr id="32" name="Straight Connector 31">
+            <a:extLst>
+              <a:ext uri="{FF2B5EF4-FFF2-40B4-BE49-F238E27FC236}">
+                <a16:creationId xmlns:a16="http://schemas.microsoft.com/office/drawing/2014/main" id="{77909DC1-07E1-50AF-E477-BDF6960690AE}"/>
+              </a:ext>
+            </a:extLst>
+          </p:cNvPr>
+          <p:cNvCxnSpPr>
+            <a:cxnSpLocks/>
+          </p:cNvCxnSpPr>
+          <p:nvPr/>
+        </p:nvCxnSpPr>
+        <p:spPr>
+          <a:xfrm>
+            <a:off x="10039976" y="1731162"/>
+            <a:ext cx="252548" cy="175200"/>
+          </a:xfrm>
+          <a:prstGeom prst="line">
+            <a:avLst/>
+          </a:prstGeom>
+          <a:ln w="28575">
+            <a:solidFill>
+              <a:schemeClr val="bg1"/>
+            </a:solidFill>
+            <a:prstDash val="sysDot"/>
+          </a:ln>
+        </p:spPr>
+        <p:style>
+          <a:lnRef idx="2">
+            <a:schemeClr val="accent1"/>
+          </a:lnRef>
+          <a:fillRef idx="0">
+            <a:schemeClr val="accent1"/>
+          </a:fillRef>
+          <a:effectRef idx="1">
+            <a:schemeClr val="accent1"/>
+          </a:effectRef>
+          <a:fontRef idx="minor">
+            <a:schemeClr val="tx1"/>
+          </a:fontRef>
+        </p:style>
+      </p:cxnSp>
+      <p:cxnSp>
+        <p:nvCxnSpPr>
+          <p:cNvPr id="33" name="Straight Connector 32">
+            <a:extLst>
+              <a:ext uri="{FF2B5EF4-FFF2-40B4-BE49-F238E27FC236}">
+                <a16:creationId xmlns:a16="http://schemas.microsoft.com/office/drawing/2014/main" id="{B7266AAB-E3E8-4417-581F-A158A026BBFF}"/>
+              </a:ext>
+            </a:extLst>
+          </p:cNvPr>
+          <p:cNvCxnSpPr>
+            <a:cxnSpLocks/>
+          </p:cNvCxnSpPr>
+          <p:nvPr/>
+        </p:nvCxnSpPr>
+        <p:spPr>
+          <a:xfrm flipV="1">
+            <a:off x="6201885" y="1818762"/>
+            <a:ext cx="248152" cy="217578"/>
+          </a:xfrm>
+          <a:prstGeom prst="line">
+            <a:avLst/>
+          </a:prstGeom>
+          <a:ln w="28575">
+            <a:solidFill>
+              <a:schemeClr val="bg1"/>
+            </a:solidFill>
+            <a:prstDash val="sysDot"/>
+          </a:ln>
+        </p:spPr>
+        <p:style>
+          <a:lnRef idx="2">
+            <a:schemeClr val="accent1"/>
+          </a:lnRef>
+          <a:fillRef idx="0">
+            <a:schemeClr val="accent1"/>
+          </a:fillRef>
+          <a:effectRef idx="1">
+            <a:schemeClr val="accent1"/>
+          </a:effectRef>
+          <a:fontRef idx="minor">
+            <a:schemeClr val="tx1"/>
+          </a:fontRef>
+        </p:style>
+      </p:cxnSp>
+      <p:pic>
+        <p:nvPicPr>
+          <p:cNvPr id="36" name="Picture 35">
+            <a:extLst>
+              <a:ext uri="{FF2B5EF4-FFF2-40B4-BE49-F238E27FC236}">
+                <a16:creationId xmlns:a16="http://schemas.microsoft.com/office/drawing/2014/main" id="{031B5A7E-A5D2-114E-E714-1924D437D725}"/>
+              </a:ext>
+            </a:extLst>
+          </p:cNvPr>
+          <p:cNvPicPr>
+            <a:picLocks noChangeAspect="1"/>
+          </p:cNvPicPr>
+          <p:nvPr/>
+        </p:nvPicPr>
+        <p:blipFill>
+          <a:blip r:embed="rId7"/>
+          <a:stretch>
+            <a:fillRect/>
+          </a:stretch>
+        </p:blipFill>
+        <p:spPr>
+          <a:xfrm>
+            <a:off x="6998223" y="2139623"/>
+            <a:ext cx="699190" cy="759336"/>
+          </a:xfrm>
+          <a:prstGeom prst="rect">
+            <a:avLst/>
+          </a:prstGeom>
+          <a:ln w="9525" cap="sq">
+            <a:solidFill>
+              <a:srgbClr val="000000"/>
+            </a:solidFill>
+            <a:prstDash val="solid"/>
+            <a:miter lim="800000"/>
+          </a:ln>
+          <a:effectLst>
+            <a:outerShdw blurRad="50800" dist="38100" dir="2700000" algn="tl" rotWithShape="0">
+              <a:srgbClr val="000000">
+                <a:alpha val="43000"/>
+              </a:srgbClr>
+            </a:outerShdw>
+          </a:effectLst>
+        </p:spPr>
+      </p:pic>
+      <p:cxnSp>
+        <p:nvCxnSpPr>
+          <p:cNvPr id="37" name="Straight Connector 36">
+            <a:extLst>
+              <a:ext uri="{FF2B5EF4-FFF2-40B4-BE49-F238E27FC236}">
+                <a16:creationId xmlns:a16="http://schemas.microsoft.com/office/drawing/2014/main" id="{1123BEF3-4C85-1F5B-0F39-600F0DEF0231}"/>
+              </a:ext>
+            </a:extLst>
+          </p:cNvPr>
+          <p:cNvCxnSpPr>
+            <a:cxnSpLocks/>
+            <a:endCxn id="36" idx="1"/>
+          </p:cNvCxnSpPr>
+          <p:nvPr/>
+        </p:nvCxnSpPr>
+        <p:spPr>
+          <a:xfrm>
+            <a:off x="6450037" y="2519291"/>
+            <a:ext cx="548186" cy="0"/>
+          </a:xfrm>
+          <a:prstGeom prst="line">
+            <a:avLst/>
+          </a:prstGeom>
+          <a:ln w="28575">
+            <a:solidFill>
+              <a:schemeClr val="bg1"/>
+            </a:solidFill>
+            <a:prstDash val="solid"/>
+          </a:ln>
+        </p:spPr>
+        <p:style>
+          <a:lnRef idx="2">
+            <a:schemeClr val="accent1"/>
+          </a:lnRef>
+          <a:fillRef idx="0">
+            <a:schemeClr val="accent1"/>
+          </a:fillRef>
+          <a:effectRef idx="1">
+            <a:schemeClr val="accent1"/>
+          </a:effectRef>
+          <a:fontRef idx="minor">
+            <a:schemeClr val="tx1"/>
+          </a:fontRef>
+        </p:style>
+      </p:cxnSp>
+      <p:pic>
+        <p:nvPicPr>
+          <p:cNvPr id="44" name="Picture 43">
+            <a:extLst>
+              <a:ext uri="{FF2B5EF4-FFF2-40B4-BE49-F238E27FC236}">
+                <a16:creationId xmlns:a16="http://schemas.microsoft.com/office/drawing/2014/main" id="{57BEF86A-72C5-3759-FDBD-2720CB559766}"/>
+              </a:ext>
+            </a:extLst>
+          </p:cNvPr>
+          <p:cNvPicPr>
+            <a:picLocks noChangeAspect="1"/>
+          </p:cNvPicPr>
+          <p:nvPr/>
+        </p:nvPicPr>
+        <p:blipFill>
+          <a:blip r:embed="rId8"/>
+          <a:stretch>
+            <a:fillRect/>
+          </a:stretch>
+        </p:blipFill>
+        <p:spPr>
+          <a:xfrm>
+            <a:off x="6859340" y="2984853"/>
+            <a:ext cx="766365" cy="728363"/>
+          </a:xfrm>
+          <a:prstGeom prst="rect">
+            <a:avLst/>
+          </a:prstGeom>
+          <a:ln w="19050" cap="sq">
+            <a:solidFill>
+              <a:srgbClr val="000000"/>
+            </a:solidFill>
+            <a:prstDash val="solid"/>
+            <a:miter lim="800000"/>
+          </a:ln>
+          <a:effectLst>
+            <a:outerShdw blurRad="50800" dist="38100" dir="2700000" algn="tl" rotWithShape="0">
+              <a:srgbClr val="000000">
+                <a:alpha val="43000"/>
+              </a:srgbClr>
+            </a:outerShdw>
+          </a:effectLst>
+        </p:spPr>
+      </p:pic>
+      <p:cxnSp>
+        <p:nvCxnSpPr>
+          <p:cNvPr id="45" name="Straight Connector 44">
+            <a:extLst>
+              <a:ext uri="{FF2B5EF4-FFF2-40B4-BE49-F238E27FC236}">
+                <a16:creationId xmlns:a16="http://schemas.microsoft.com/office/drawing/2014/main" id="{0C4D3803-1DC2-3DF3-6BC3-DC948AED7DAE}"/>
+              </a:ext>
+            </a:extLst>
+          </p:cNvPr>
+          <p:cNvCxnSpPr/>
+          <p:nvPr/>
+        </p:nvCxnSpPr>
+        <p:spPr>
+          <a:xfrm>
+            <a:off x="6466900" y="3185904"/>
+            <a:ext cx="435429" cy="0"/>
+          </a:xfrm>
+          <a:prstGeom prst="line">
+            <a:avLst/>
+          </a:prstGeom>
+          <a:ln w="28575">
+            <a:solidFill>
+              <a:schemeClr val="bg1"/>
+            </a:solidFill>
+            <a:prstDash val="solid"/>
+          </a:ln>
+        </p:spPr>
+        <p:style>
+          <a:lnRef idx="2">
+            <a:schemeClr val="accent1"/>
+          </a:lnRef>
+          <a:fillRef idx="0">
+            <a:schemeClr val="accent1"/>
+          </a:fillRef>
+          <a:effectRef idx="1">
+            <a:schemeClr val="accent1"/>
+          </a:effectRef>
+          <a:fontRef idx="minor">
+            <a:schemeClr val="tx1"/>
+          </a:fontRef>
+        </p:style>
+      </p:cxnSp>
+      <p:cxnSp>
+        <p:nvCxnSpPr>
+          <p:cNvPr id="46" name="Straight Connector 45">
+            <a:extLst>
+              <a:ext uri="{FF2B5EF4-FFF2-40B4-BE49-F238E27FC236}">
+                <a16:creationId xmlns:a16="http://schemas.microsoft.com/office/drawing/2014/main" id="{1DA3B468-311E-0F34-E4E8-9FD5C6A70DD0}"/>
+              </a:ext>
+            </a:extLst>
+          </p:cNvPr>
+          <p:cNvCxnSpPr>
+            <a:cxnSpLocks/>
+          </p:cNvCxnSpPr>
+          <p:nvPr/>
+        </p:nvCxnSpPr>
+        <p:spPr>
+          <a:xfrm>
+            <a:off x="6252648" y="3002243"/>
+            <a:ext cx="208523" cy="183661"/>
+          </a:xfrm>
+          <a:prstGeom prst="line">
+            <a:avLst/>
+          </a:prstGeom>
+          <a:ln w="28575">
+            <a:solidFill>
+              <a:schemeClr val="bg1"/>
+            </a:solidFill>
+            <a:prstDash val="sysDot"/>
+          </a:ln>
+        </p:spPr>
+        <p:style>
+          <a:lnRef idx="2">
+            <a:schemeClr val="accent1"/>
+          </a:lnRef>
+          <a:fillRef idx="0">
+            <a:schemeClr val="accent1"/>
+          </a:fillRef>
+          <a:effectRef idx="1">
+            <a:schemeClr val="accent1"/>
+          </a:effectRef>
+          <a:fontRef idx="minor">
+            <a:schemeClr val="tx1"/>
+          </a:fontRef>
+        </p:style>
+      </p:cxnSp>
+      <p:pic>
+        <p:nvPicPr>
+          <p:cNvPr id="50" name="Picture 49">
+            <a:extLst>
+              <a:ext uri="{FF2B5EF4-FFF2-40B4-BE49-F238E27FC236}">
+                <a16:creationId xmlns:a16="http://schemas.microsoft.com/office/drawing/2014/main" id="{AE08F3ED-C603-6447-14AD-BD418808C251}"/>
+              </a:ext>
+            </a:extLst>
+          </p:cNvPr>
+          <p:cNvPicPr>
+            <a:picLocks noChangeAspect="1"/>
+          </p:cNvPicPr>
+          <p:nvPr/>
+        </p:nvPicPr>
+        <p:blipFill>
+          <a:blip r:embed="rId9"/>
+          <a:stretch>
+            <a:fillRect/>
+          </a:stretch>
+        </p:blipFill>
+        <p:spPr>
+          <a:xfrm>
+            <a:off x="5077097" y="2095239"/>
+            <a:ext cx="1035208" cy="304770"/>
+          </a:xfrm>
+          <a:prstGeom prst="roundRect">
+            <a:avLst>
+              <a:gd name="adj" fmla="val 16667"/>
+            </a:avLst>
+          </a:prstGeom>
+          <a:ln>
+            <a:noFill/>
+          </a:ln>
+          <a:effectLst>
+            <a:outerShdw blurRad="76200" dist="38100" dir="7800000" algn="tl" rotWithShape="0">
+              <a:srgbClr val="000000">
+                <a:alpha val="40000"/>
+              </a:srgbClr>
+            </a:outerShdw>
+          </a:effectLst>
+          <a:scene3d>
+            <a:camera prst="orthographicFront"/>
+            <a:lightRig rig="contrasting" dir="t">
+              <a:rot lat="0" lon="0" rev="4200000"/>
+            </a:lightRig>
+          </a:scene3d>
+          <a:sp3d prstMaterial="plastic">
+            <a:bevelT w="381000" h="114300" prst="relaxedInset"/>
+            <a:contourClr>
+              <a:srgbClr val="969696"/>
+            </a:contourClr>
+          </a:sp3d>
+        </p:spPr>
+      </p:pic>
+      <p:pic>
+        <p:nvPicPr>
+          <p:cNvPr id="52" name="Picture 51">
+            <a:extLst>
+              <a:ext uri="{FF2B5EF4-FFF2-40B4-BE49-F238E27FC236}">
+                <a16:creationId xmlns:a16="http://schemas.microsoft.com/office/drawing/2014/main" id="{B530245E-A25B-0CF9-1D76-5DBBD1C26651}"/>
+              </a:ext>
+            </a:extLst>
+          </p:cNvPr>
+          <p:cNvPicPr>
+            <a:picLocks noChangeAspect="1"/>
+          </p:cNvPicPr>
+          <p:nvPr/>
+        </p:nvPicPr>
+        <p:blipFill>
+          <a:blip r:embed="rId10"/>
+          <a:stretch>
+            <a:fillRect/>
+          </a:stretch>
+        </p:blipFill>
+        <p:spPr>
+          <a:xfrm>
+            <a:off x="5113332" y="2507018"/>
+            <a:ext cx="480075" cy="516080"/>
+          </a:xfrm>
+          <a:prstGeom prst="roundRect">
+            <a:avLst>
+              <a:gd name="adj" fmla="val 16667"/>
+            </a:avLst>
+          </a:prstGeom>
+          <a:ln>
+            <a:noFill/>
+          </a:ln>
+          <a:effectLst>
+            <a:outerShdw blurRad="76200" dist="38100" dir="7800000" algn="tl" rotWithShape="0">
+              <a:srgbClr val="000000">
+                <a:alpha val="40000"/>
+              </a:srgbClr>
+            </a:outerShdw>
+          </a:effectLst>
+          <a:scene3d>
+            <a:camera prst="orthographicFront"/>
+            <a:lightRig rig="contrasting" dir="t">
+              <a:rot lat="0" lon="0" rev="4200000"/>
+            </a:lightRig>
+          </a:scene3d>
+          <a:sp3d prstMaterial="plastic">
+            <a:bevelT w="381000" h="114300" prst="relaxedInset"/>
+            <a:contourClr>
+              <a:srgbClr val="969696"/>
+            </a:contourClr>
+          </a:sp3d>
+        </p:spPr>
+      </p:pic>
+      <p:pic>
+        <p:nvPicPr>
+          <p:cNvPr id="54" name="Picture 53">
+            <a:extLst>
+              <a:ext uri="{FF2B5EF4-FFF2-40B4-BE49-F238E27FC236}">
+                <a16:creationId xmlns:a16="http://schemas.microsoft.com/office/drawing/2014/main" id="{8286DF25-7849-0EA5-D249-566E454C20C3}"/>
+              </a:ext>
+            </a:extLst>
+          </p:cNvPr>
+          <p:cNvPicPr>
+            <a:picLocks noChangeAspect="1"/>
+          </p:cNvPicPr>
+          <p:nvPr/>
+        </p:nvPicPr>
+        <p:blipFill>
+          <a:blip r:embed="rId11"/>
+          <a:stretch>
+            <a:fillRect/>
+          </a:stretch>
+        </p:blipFill>
+        <p:spPr>
+          <a:xfrm>
+            <a:off x="5705626" y="2508695"/>
+            <a:ext cx="434803" cy="516075"/>
+          </a:xfrm>
+          <a:prstGeom prst="roundRect">
+            <a:avLst>
+              <a:gd name="adj" fmla="val 16667"/>
+            </a:avLst>
+          </a:prstGeom>
+          <a:ln>
+            <a:noFill/>
+          </a:ln>
+          <a:effectLst>
+            <a:outerShdw blurRad="76200" dist="38100" dir="7800000" algn="tl" rotWithShape="0">
+              <a:srgbClr val="000000">
+                <a:alpha val="40000"/>
+              </a:srgbClr>
+            </a:outerShdw>
+          </a:effectLst>
+          <a:scene3d>
+            <a:camera prst="orthographicFront"/>
+            <a:lightRig rig="contrasting" dir="t">
+              <a:rot lat="0" lon="0" rev="4200000"/>
+            </a:lightRig>
+          </a:scene3d>
+          <a:sp3d prstMaterial="plastic">
+            <a:bevelT w="381000" h="114300" prst="relaxedInset"/>
+            <a:contourClr>
+              <a:srgbClr val="969696"/>
+            </a:contourClr>
+          </a:sp3d>
+        </p:spPr>
+      </p:pic>
+      <p:sp>
+        <p:nvSpPr>
+          <p:cNvPr id="56" name="Rectangle 55">
+            <a:extLst>
+              <a:ext uri="{FF2B5EF4-FFF2-40B4-BE49-F238E27FC236}">
+                <a16:creationId xmlns:a16="http://schemas.microsoft.com/office/drawing/2014/main" id="{395365F8-78E0-53C9-FEC3-AE2A45449238}"/>
+              </a:ext>
+            </a:extLst>
+          </p:cNvPr>
+          <p:cNvSpPr/>
+          <p:nvPr/>
+        </p:nvSpPr>
+        <p:spPr>
+          <a:xfrm>
+            <a:off x="5234051" y="1736371"/>
+            <a:ext cx="838131" cy="304525"/>
+          </a:xfrm>
+          <a:prstGeom prst="rect">
+            <a:avLst/>
+          </a:prstGeom>
+          <a:noFill/>
+          <a:ln>
+            <a:noFill/>
+          </a:ln>
+        </p:spPr>
+        <p:style>
+          <a:lnRef idx="2">
+            <a:schemeClr val="accent1">
+              <a:shade val="15000"/>
+            </a:schemeClr>
+          </a:lnRef>
+          <a:fillRef idx="1">
+            <a:schemeClr val="accent1"/>
+          </a:fillRef>
+          <a:effectRef idx="0">
+            <a:schemeClr val="accent1"/>
+          </a:effectRef>
+          <a:fontRef idx="minor">
+            <a:schemeClr val="lt1"/>
+          </a:fontRef>
+        </p:style>
+        <p:txBody>
+          <a:bodyPr rtlCol="0" anchor="ctr"/>
+          <a:lstStyle/>
+          <a:p>
+            <a:pPr algn="ctr"/>
+            <a:r>
+              <a:rPr lang="en-US" sz="1400" b="1" dirty="0">
+                <a:solidFill>
+                  <a:schemeClr val="bg1"/>
+                </a:solidFill>
+              </a:rPr>
+              <a:t>LLM-AI</a:t>
+            </a:r>
+            <a:endParaRPr lang="en-SG" sz="1400" b="1" dirty="0">
+              <a:solidFill>
+                <a:schemeClr val="bg1"/>
+              </a:solidFill>
+            </a:endParaRPr>
+          </a:p>
+        </p:txBody>
+      </p:sp>
+      <p:sp>
+        <p:nvSpPr>
+          <p:cNvPr id="57" name="Rectangle 56">
+            <a:extLst>
+              <a:ext uri="{FF2B5EF4-FFF2-40B4-BE49-F238E27FC236}">
+                <a16:creationId xmlns:a16="http://schemas.microsoft.com/office/drawing/2014/main" id="{00803F8B-7A84-FEE1-7643-54885651093D}"/>
+              </a:ext>
+            </a:extLst>
+          </p:cNvPr>
+          <p:cNvSpPr/>
+          <p:nvPr/>
+        </p:nvSpPr>
+        <p:spPr>
+          <a:xfrm>
+            <a:off x="1345234" y="2261484"/>
+            <a:ext cx="2167911" cy="703421"/>
+          </a:xfrm>
+          <a:prstGeom prst="rect">
+            <a:avLst/>
+          </a:prstGeom>
+          <a:solidFill>
+            <a:schemeClr val="tx2">
+              <a:lumMod val="90000"/>
+              <a:lumOff val="10000"/>
+            </a:schemeClr>
+          </a:solidFill>
+          <a:ln>
+            <a:noFill/>
+          </a:ln>
+        </p:spPr>
+        <p:style>
+          <a:lnRef idx="2">
+            <a:schemeClr val="accent1">
+              <a:shade val="15000"/>
+            </a:schemeClr>
+          </a:lnRef>
+          <a:fillRef idx="1">
+            <a:schemeClr val="accent1"/>
+          </a:fillRef>
+          <a:effectRef idx="0">
+            <a:schemeClr val="accent1"/>
+          </a:effectRef>
+          <a:fontRef idx="minor">
+            <a:schemeClr val="lt1"/>
+          </a:fontRef>
+        </p:style>
+        <p:txBody>
+          <a:bodyPr rtlCol="0" anchor="ctr"/>
+          <a:lstStyle/>
+          <a:p>
+            <a:r>
+              <a:rPr lang="en-US" sz="2400" b="1" dirty="0"/>
+              <a:t>Applying </a:t>
+            </a:r>
+          </a:p>
+          <a:p>
+            <a:r>
+              <a:rPr lang="en-US" sz="2400" b="1" dirty="0"/>
+              <a:t>Large Language Models (LLMs) to Solve Cybersecurity Questions</a:t>
+            </a:r>
+            <a:endParaRPr lang="en-SG" sz="2400" b="1" dirty="0"/>
+          </a:p>
+        </p:txBody>
+      </p:sp>
+    </p:spTree>
+    <p:extLst>
+      <p:ext uri="{BB962C8B-B14F-4D97-AF65-F5344CB8AC3E}">
+        <p14:creationId xmlns:p14="http://schemas.microsoft.com/office/powerpoint/2010/main" val="1049773368"/>
+      </p:ext>
+    </p:extLst>
+  </p:cSld>
+  <p:clrMapOvr>
+    <a:masterClrMapping/>
+  </p:clrMapOvr>
+</p:sld>
+</file>
+
+<file path=ppt/slides/slide2.xml><?xml version="1.0" encoding="utf-8"?>
+<p:sld xmlns:a="http://schemas.openxmlformats.org/drawingml/2006/main" xmlns:r="http://schemas.openxmlformats.org/officeDocument/2006/relationships" xmlns:p="http://schemas.openxmlformats.org/presentationml/2006/main">
+  <p:cSld>
+    <p:spTree>
+      <p:nvGrpSpPr>
+        <p:cNvPr id="1" name=""/>
+        <p:cNvGrpSpPr/>
+        <p:nvPr/>
+      </p:nvGrpSpPr>
+      <p:grpSpPr>
+        <a:xfrm>
+          <a:off x="0" y="0"/>
+          <a:ext cx="0" cy="0"/>
+          <a:chOff x="0" y="0"/>
+          <a:chExt cx="0" cy="0"/>
+        </a:xfrm>
+      </p:grpSpPr>
       <p:sp>
         <p:nvSpPr>
           <p:cNvPr id="4" name="Oval 3">
@@ -4808,6 +5920,89 @@
           </a:p>
         </p:txBody>
       </p:sp>
+      <p:pic>
+        <p:nvPicPr>
+          <p:cNvPr id="2" name="Picture 1" descr="A black and white logo&#10;&#10;Description automatically generated">
+            <a:extLst>
+              <a:ext uri="{FF2B5EF4-FFF2-40B4-BE49-F238E27FC236}">
+                <a16:creationId xmlns:a16="http://schemas.microsoft.com/office/drawing/2014/main" id="{0DFD0BF6-0021-609D-16EA-8BE18839FB02}"/>
+              </a:ext>
+            </a:extLst>
+          </p:cNvPr>
+          <p:cNvPicPr>
+            <a:picLocks noChangeAspect="1"/>
+          </p:cNvPicPr>
+          <p:nvPr/>
+        </p:nvPicPr>
+        <p:blipFill>
+          <a:blip r:embed="rId2">
+            <a:extLst>
+              <a:ext uri="{28A0092B-C50C-407E-A947-70E740481C1C}">
+                <a14:useLocalDpi xmlns:a14="http://schemas.microsoft.com/office/drawing/2010/main" val="0"/>
+              </a:ext>
+            </a:extLst>
+          </a:blip>
+          <a:stretch>
+            <a:fillRect/>
+          </a:stretch>
+        </p:blipFill>
+        <p:spPr>
+          <a:xfrm>
+            <a:off x="7930015" y="5389906"/>
+            <a:ext cx="4219924" cy="935275"/>
+          </a:xfrm>
+          <a:prstGeom prst="rect">
+            <a:avLst/>
+          </a:prstGeom>
+        </p:spPr>
+      </p:pic>
+      <p:pic>
+        <p:nvPicPr>
+          <p:cNvPr id="1030" name="Picture 6" descr="Exam Multiple-Choice&quot; Icon - Download for free – Iconduck">
+            <a:extLst>
+              <a:ext uri="{FF2B5EF4-FFF2-40B4-BE49-F238E27FC236}">
+                <a16:creationId xmlns:a16="http://schemas.microsoft.com/office/drawing/2014/main" id="{FA9AD9A3-31B7-A64A-38AB-B72AA7B18F76}"/>
+              </a:ext>
+            </a:extLst>
+          </p:cNvPr>
+          <p:cNvPicPr>
+            <a:picLocks noChangeAspect="1" noChangeArrowheads="1"/>
+          </p:cNvPicPr>
+          <p:nvPr/>
+        </p:nvPicPr>
+        <p:blipFill>
+          <a:blip r:embed="rId3">
+            <a:extLst>
+              <a:ext uri="{28A0092B-C50C-407E-A947-70E740481C1C}">
+                <a14:useLocalDpi xmlns:a14="http://schemas.microsoft.com/office/drawing/2010/main" val="0"/>
+              </a:ext>
+            </a:extLst>
+          </a:blip>
+          <a:srcRect/>
+          <a:stretch>
+            <a:fillRect/>
+          </a:stretch>
+        </p:blipFill>
+        <p:spPr bwMode="auto">
+          <a:xfrm>
+            <a:off x="10039977" y="2670840"/>
+            <a:ext cx="410310" cy="410310"/>
+          </a:xfrm>
+          <a:prstGeom prst="rect">
+            <a:avLst/>
+          </a:prstGeom>
+          <a:noFill/>
+          <a:extLst>
+            <a:ext uri="{909E8E84-426E-40DD-AFC4-6F175D3DCCD1}">
+              <a14:hiddenFill xmlns:a14="http://schemas.microsoft.com/office/drawing/2010/main">
+                <a:solidFill>
+                  <a:srgbClr val="FFFFFF"/>
+                </a:solidFill>
+              </a14:hiddenFill>
+            </a:ext>
+          </a:extLst>
+        </p:spPr>
+      </p:pic>
     </p:spTree>
     <p:extLst>
       <p:ext uri="{BB962C8B-B14F-4D97-AF65-F5344CB8AC3E}">

</xml_diff>